<commit_message>
Agregados Tests Equipo y Validator
</commit_message>
<xml_diff>
--- a/Designing Testable Applications Part III - Frontend Unit Tests.pptx
+++ b/Designing Testable Applications Part III - Frontend Unit Tests.pptx
@@ -6002,7 +6002,7 @@
           <a:graphicData uri="http://schemas.openxmlformats.org/presentationml/2006/ole">
             <mc:AlternateContent xmlns:mc="http://schemas.openxmlformats.org/markup-compatibility/2006">
               <mc:Choice xmlns:v="urn:schemas-microsoft-com:vml" Requires="v">
-                <p:oleObj spid="_x0000_s3380" name="Image" r:id="rId4" imgW="2920320" imgH="2856960" progId="Photoshop.Image.16">
+                <p:oleObj spid="_x0000_s3383" name="Image" r:id="rId4" imgW="2920320" imgH="2856960" progId="Photoshop.Image.16">
                   <p:embed/>
                 </p:oleObj>
               </mc:Choice>
@@ -6055,7 +6055,7 @@
           <a:graphicData uri="http://schemas.openxmlformats.org/presentationml/2006/ole">
             <mc:AlternateContent xmlns:mc="http://schemas.openxmlformats.org/markup-compatibility/2006">
               <mc:Choice xmlns:v="urn:schemas-microsoft-com:vml" Requires="v">
-                <p:oleObj spid="_x0000_s3381" name="Image" r:id="rId6" imgW="2920320" imgH="2856960" progId="Photoshop.Image.16">
+                <p:oleObj spid="_x0000_s3384" name="Image" r:id="rId6" imgW="2920320" imgH="2856960" progId="Photoshop.Image.16">
                   <p:embed/>
                 </p:oleObj>
               </mc:Choice>
@@ -6112,7 +6112,7 @@
           <a:graphicData uri="http://schemas.openxmlformats.org/presentationml/2006/ole">
             <mc:AlternateContent xmlns:mc="http://schemas.openxmlformats.org/markup-compatibility/2006">
               <mc:Choice xmlns:v="urn:schemas-microsoft-com:vml" Requires="v">
-                <p:oleObj spid="_x0000_s3382" name="Image" r:id="rId8" imgW="2920320" imgH="2856960" progId="Photoshop.Image.16">
+                <p:oleObj spid="_x0000_s3385" name="Image" r:id="rId8" imgW="2920320" imgH="2856960" progId="Photoshop.Image.16">
                   <p:embed/>
                 </p:oleObj>
               </mc:Choice>
@@ -14987,7 +14987,6 @@
               <a:rPr lang="es-AR" dirty="0" smtClean="0"/>
               <a:t>Resumen</a:t>
             </a:r>
-            <a:endParaRPr lang="es-AR" dirty="0" smtClean="0"/>
           </a:p>
         </p:txBody>
       </p:sp>
@@ -17057,7 +17056,23 @@
                   <a:srgbClr val="000000"/>
                 </a:solidFill>
               </a:rPr>
-              <a:t>incluyendo también JavaScript!</a:t>
+              <a:t>incluyendo </a:t>
+            </a:r>
+            <a:r>
+              <a:rPr lang="es-AR" b="1" dirty="0" smtClean="0">
+                <a:solidFill>
+                  <a:srgbClr val="000000"/>
+                </a:solidFill>
+              </a:rPr>
+              <a:t>JavaScript</a:t>
+            </a:r>
+            <a:r>
+              <a:rPr lang="es-AR" b="1" dirty="0">
+                <a:solidFill>
+                  <a:srgbClr val="000000"/>
+                </a:solidFill>
+              </a:rPr>
+              <a:t>!</a:t>
             </a:r>
             <a:endParaRPr lang="es-AR" b="1" dirty="0" smtClean="0">
               <a:solidFill>
@@ -21962,12 +21977,6 @@
 </file>
 
 <file path=customXml/item1.xml><?xml version="1.0" encoding="utf-8"?>
-<p:properties xmlns:p="http://schemas.microsoft.com/office/2006/metadata/properties" xmlns:xsi="http://www.w3.org/2001/XMLSchema-instance" xmlns:pc="http://schemas.microsoft.com/office/infopath/2007/PartnerControls">
-  <documentManagement/>
-</p:properties>
-</file>
-
-<file path=customXml/item2.xml><?xml version="1.0" encoding="utf-8"?>
 <ct:contentTypeSchema xmlns:ct="http://schemas.microsoft.com/office/2006/metadata/contentType" xmlns:ma="http://schemas.microsoft.com/office/2006/metadata/properties/metaAttributes" ct:_="" ma:_="" ma:contentTypeName="Documento" ma:contentTypeID="0x0101003ADB8EEE65C30C46B0738F337B75258F" ma:contentTypeVersion="0" ma:contentTypeDescription="Crear nuevo documento." ma:contentTypeScope="" ma:versionID="7bfd305fe848610ec8ddd6cb2c162981">
   <xsd:schema xmlns:xsd="http://www.w3.org/2001/XMLSchema" xmlns:xs="http://www.w3.org/2001/XMLSchema" xmlns:p="http://schemas.microsoft.com/office/2006/metadata/properties" targetNamespace="http://schemas.microsoft.com/office/2006/metadata/properties" ma:root="true" ma:fieldsID="ebba8a198e9bb40c3eeca6d0bd41257a">
     <xsd:element name="properties">
@@ -22081,6 +22090,12 @@
 </ct:contentTypeSchema>
 </file>
 
+<file path=customXml/item2.xml><?xml version="1.0" encoding="utf-8"?>
+<p:properties xmlns:p="http://schemas.microsoft.com/office/2006/metadata/properties" xmlns:xsi="http://www.w3.org/2001/XMLSchema-instance" xmlns:pc="http://schemas.microsoft.com/office/infopath/2007/PartnerControls">
+  <documentManagement/>
+</p:properties>
+</file>
+
 <file path=customXml/item3.xml><?xml version="1.0" encoding="utf-8"?>
 <?mso-contentType ?>
 <FormTemplates xmlns="http://schemas.microsoft.com/sharepoint/v3/contenttype/forms">
@@ -22091,15 +22106,6 @@
 </file>
 
 <file path=customXml/itemProps1.xml><?xml version="1.0" encoding="utf-8"?>
-<ds:datastoreItem xmlns:ds="http://schemas.openxmlformats.org/officeDocument/2006/customXml" ds:itemID="{9AB95CA3-6658-4A3E-BCCB-86304949D862}">
-  <ds:schemaRefs>
-    <ds:schemaRef ds:uri="http://schemas.microsoft.com/office/2006/metadata/properties"/>
-    <ds:schemaRef ds:uri="http://schemas.microsoft.com/office/infopath/2007/PartnerControls"/>
-  </ds:schemaRefs>
-</ds:datastoreItem>
-</file>
-
-<file path=customXml/itemProps2.xml><?xml version="1.0" encoding="utf-8"?>
 <ds:datastoreItem xmlns:ds="http://schemas.openxmlformats.org/officeDocument/2006/customXml" ds:itemID="{B29A6B9D-DD38-4AD9-8569-FE55D7D21842}">
   <ds:schemaRefs>
     <ds:schemaRef ds:uri="http://schemas.microsoft.com/office/2006/metadata/contentType"/>
@@ -22115,6 +22121,15 @@
 </ds:datastoreItem>
 </file>
 
+<file path=customXml/itemProps2.xml><?xml version="1.0" encoding="utf-8"?>
+<ds:datastoreItem xmlns:ds="http://schemas.openxmlformats.org/officeDocument/2006/customXml" ds:itemID="{9AB95CA3-6658-4A3E-BCCB-86304949D862}">
+  <ds:schemaRefs>
+    <ds:schemaRef ds:uri="http://schemas.microsoft.com/office/2006/metadata/properties"/>
+    <ds:schemaRef ds:uri="http://schemas.microsoft.com/office/infopath/2007/PartnerControls"/>
+  </ds:schemaRefs>
+</ds:datastoreItem>
+</file>
+
 <file path=customXml/itemProps3.xml><?xml version="1.0" encoding="utf-8"?>
 <ds:datastoreItem xmlns:ds="http://schemas.openxmlformats.org/officeDocument/2006/customXml" ds:itemID="{EDBEB935-7F6F-426D-B200-B7CC03EB48A6}">
   <ds:schemaRefs>

</xml_diff>